<commit_message>
Add final changes to the documentation
</commit_message>
<xml_diff>
--- a/documentation/docx/EuroDict.pptx
+++ b/documentation/docx/EuroDict.pptx
@@ -1979,6 +1979,148 @@
         </pc:spChg>
         <pc:spChg chg="mod">
           <ac:chgData name="Lyubomir" userId="ad03ba5218a37c6f" providerId="LiveId" clId="{E125F29C-16E6-450E-84C4-49D887294387}" dt="2022-11-29T18:28:40.714" v="8" actId="2711"/>
+          <ac:spMkLst>
+            <pc:docMk/>
+            <pc:sldMk cId="0" sldId="265"/>
+            <ac:spMk id="803" creationId="{00000000-0000-0000-0000-000000000000}"/>
+          </ac:spMkLst>
+        </pc:spChg>
+      </pc:sldChg>
+    </pc:docChg>
+  </pc:docChgLst>
+  <pc:docChgLst>
+    <pc:chgData name="Lyubomir" userId="ad03ba5218a37c6f" providerId="LiveId" clId="{A7372175-8C66-453F-BEE1-03CEFFB9715C}"/>
+    <pc:docChg chg="modSld">
+      <pc:chgData name="Lyubomir" userId="ad03ba5218a37c6f" providerId="LiveId" clId="{A7372175-8C66-453F-BEE1-03CEFFB9715C}" dt="2022-11-30T19:14:53.409" v="18" actId="1076"/>
+      <pc:docMkLst>
+        <pc:docMk/>
+      </pc:docMkLst>
+      <pc:sldChg chg="modSp mod">
+        <pc:chgData name="Lyubomir" userId="ad03ba5218a37c6f" providerId="LiveId" clId="{A7372175-8C66-453F-BEE1-03CEFFB9715C}" dt="2022-11-30T19:13:39.937" v="6" actId="2711"/>
+        <pc:sldMkLst>
+          <pc:docMk/>
+          <pc:sldMk cId="0" sldId="256"/>
+        </pc:sldMkLst>
+        <pc:spChg chg="mod">
+          <ac:chgData name="Lyubomir" userId="ad03ba5218a37c6f" providerId="LiveId" clId="{A7372175-8C66-453F-BEE1-03CEFFB9715C}" dt="2022-11-30T19:13:39.937" v="6" actId="2711"/>
+          <ac:spMkLst>
+            <pc:docMk/>
+            <pc:sldMk cId="0" sldId="256"/>
+            <ac:spMk id="663" creationId="{00000000-0000-0000-0000-000000000000}"/>
+          </ac:spMkLst>
+        </pc:spChg>
+        <pc:spChg chg="mod">
+          <ac:chgData name="Lyubomir" userId="ad03ba5218a37c6f" providerId="LiveId" clId="{A7372175-8C66-453F-BEE1-03CEFFB9715C}" dt="2022-11-30T19:13:32.610" v="5" actId="2711"/>
+          <ac:spMkLst>
+            <pc:docMk/>
+            <pc:sldMk cId="0" sldId="256"/>
+            <ac:spMk id="668" creationId="{00000000-0000-0000-0000-000000000000}"/>
+          </ac:spMkLst>
+        </pc:spChg>
+      </pc:sldChg>
+      <pc:sldChg chg="modSp mod">
+        <pc:chgData name="Lyubomir" userId="ad03ba5218a37c6f" providerId="LiveId" clId="{A7372175-8C66-453F-BEE1-03CEFFB9715C}" dt="2022-11-30T19:14:53.409" v="18" actId="1076"/>
+        <pc:sldMkLst>
+          <pc:docMk/>
+          <pc:sldMk cId="0" sldId="258"/>
+        </pc:sldMkLst>
+        <pc:spChg chg="mod">
+          <ac:chgData name="Lyubomir" userId="ad03ba5218a37c6f" providerId="LiveId" clId="{A7372175-8C66-453F-BEE1-03CEFFB9715C}" dt="2022-11-30T19:13:58.765" v="9" actId="2711"/>
+          <ac:spMkLst>
+            <pc:docMk/>
+            <pc:sldMk cId="0" sldId="258"/>
+            <ac:spMk id="12" creationId="{D24EAA4D-6DCE-7AA2-B0B3-4F55AE6EED26}"/>
+          </ac:spMkLst>
+        </pc:spChg>
+        <pc:spChg chg="mod">
+          <ac:chgData name="Lyubomir" userId="ad03ba5218a37c6f" providerId="LiveId" clId="{A7372175-8C66-453F-BEE1-03CEFFB9715C}" dt="2022-11-30T19:14:08.829" v="11" actId="2711"/>
+          <ac:spMkLst>
+            <pc:docMk/>
+            <pc:sldMk cId="0" sldId="258"/>
+            <ac:spMk id="686" creationId="{00000000-0000-0000-0000-000000000000}"/>
+          </ac:spMkLst>
+        </pc:spChg>
+        <pc:spChg chg="mod">
+          <ac:chgData name="Lyubomir" userId="ad03ba5218a37c6f" providerId="LiveId" clId="{A7372175-8C66-453F-BEE1-03CEFFB9715C}" dt="2022-11-30T19:14:16.492" v="12" actId="2711"/>
+          <ac:spMkLst>
+            <pc:docMk/>
+            <pc:sldMk cId="0" sldId="258"/>
+            <ac:spMk id="689" creationId="{00000000-0000-0000-0000-000000000000}"/>
+          </ac:spMkLst>
+        </pc:spChg>
+        <pc:spChg chg="mod">
+          <ac:chgData name="Lyubomir" userId="ad03ba5218a37c6f" providerId="LiveId" clId="{A7372175-8C66-453F-BEE1-03CEFFB9715C}" dt="2022-11-30T19:14:53.409" v="18" actId="1076"/>
+          <ac:spMkLst>
+            <pc:docMk/>
+            <pc:sldMk cId="0" sldId="258"/>
+            <ac:spMk id="692" creationId="{00000000-0000-0000-0000-000000000000}"/>
+          </ac:spMkLst>
+        </pc:spChg>
+        <pc:spChg chg="mod">
+          <ac:chgData name="Lyubomir" userId="ad03ba5218a37c6f" providerId="LiveId" clId="{A7372175-8C66-453F-BEE1-03CEFFB9715C}" dt="2022-11-30T19:14:31.765" v="15" actId="2711"/>
+          <ac:spMkLst>
+            <pc:docMk/>
+            <pc:sldMk cId="0" sldId="258"/>
+            <ac:spMk id="694" creationId="{00000000-0000-0000-0000-000000000000}"/>
+          </ac:spMkLst>
+        </pc:spChg>
+        <pc:spChg chg="mod">
+          <ac:chgData name="Lyubomir" userId="ad03ba5218a37c6f" providerId="LiveId" clId="{A7372175-8C66-453F-BEE1-03CEFFB9715C}" dt="2022-11-30T19:14:02.246" v="10" actId="2711"/>
+          <ac:spMkLst>
+            <pc:docMk/>
+            <pc:sldMk cId="0" sldId="258"/>
+            <ac:spMk id="696" creationId="{00000000-0000-0000-0000-000000000000}"/>
+          </ac:spMkLst>
+        </pc:spChg>
+        <pc:spChg chg="mod">
+          <ac:chgData name="Lyubomir" userId="ad03ba5218a37c6f" providerId="LiveId" clId="{A7372175-8C66-453F-BEE1-03CEFFB9715C}" dt="2022-11-30T19:14:21.444" v="13" actId="2711"/>
+          <ac:spMkLst>
+            <pc:docMk/>
+            <pc:sldMk cId="0" sldId="258"/>
+            <ac:spMk id="697" creationId="{00000000-0000-0000-0000-000000000000}"/>
+          </ac:spMkLst>
+        </pc:spChg>
+        <pc:spChg chg="mod">
+          <ac:chgData name="Lyubomir" userId="ad03ba5218a37c6f" providerId="LiveId" clId="{A7372175-8C66-453F-BEE1-03CEFFB9715C}" dt="2022-11-30T19:14:27.372" v="14" actId="2711"/>
+          <ac:spMkLst>
+            <pc:docMk/>
+            <pc:sldMk cId="0" sldId="258"/>
+            <ac:spMk id="698" creationId="{00000000-0000-0000-0000-000000000000}"/>
+          </ac:spMkLst>
+        </pc:spChg>
+        <pc:spChg chg="mod">
+          <ac:chgData name="Lyubomir" userId="ad03ba5218a37c6f" providerId="LiveId" clId="{A7372175-8C66-453F-BEE1-03CEFFB9715C}" dt="2022-11-30T19:14:53.409" v="18" actId="1076"/>
+          <ac:spMkLst>
+            <pc:docMk/>
+            <pc:sldMk cId="0" sldId="258"/>
+            <ac:spMk id="699" creationId="{00000000-0000-0000-0000-000000000000}"/>
+          </ac:spMkLst>
+        </pc:spChg>
+        <pc:spChg chg="mod">
+          <ac:chgData name="Lyubomir" userId="ad03ba5218a37c6f" providerId="LiveId" clId="{A7372175-8C66-453F-BEE1-03CEFFB9715C}" dt="2022-11-30T19:14:36.588" v="16" actId="2711"/>
+          <ac:spMkLst>
+            <pc:docMk/>
+            <pc:sldMk cId="0" sldId="258"/>
+            <ac:spMk id="700" creationId="{00000000-0000-0000-0000-000000000000}"/>
+          </ac:spMkLst>
+        </pc:spChg>
+      </pc:sldChg>
+      <pc:sldChg chg="modSp mod">
+        <pc:chgData name="Lyubomir" userId="ad03ba5218a37c6f" providerId="LiveId" clId="{A7372175-8C66-453F-BEE1-03CEFFB9715C}" dt="2022-11-30T19:13:50.288" v="8" actId="2711"/>
+        <pc:sldMkLst>
+          <pc:docMk/>
+          <pc:sldMk cId="0" sldId="265"/>
+        </pc:sldMkLst>
+        <pc:spChg chg="mod">
+          <ac:chgData name="Lyubomir" userId="ad03ba5218a37c6f" providerId="LiveId" clId="{A7372175-8C66-453F-BEE1-03CEFFB9715C}" dt="2022-11-30T19:13:50.288" v="8" actId="2711"/>
+          <ac:spMkLst>
+            <pc:docMk/>
+            <pc:sldMk cId="0" sldId="265"/>
+            <ac:spMk id="788" creationId="{00000000-0000-0000-0000-000000000000}"/>
+          </ac:spMkLst>
+        </pc:spChg>
+        <pc:spChg chg="mod">
+          <ac:chgData name="Lyubomir" userId="ad03ba5218a37c6f" providerId="LiveId" clId="{A7372175-8C66-453F-BEE1-03CEFFB9715C}" dt="2022-11-30T19:13:46.005" v="7" actId="2711"/>
           <ac:spMkLst>
             <pc:docMk/>
             <pc:sldMk cId="0" sldId="265"/>
@@ -28654,7 +28796,7 @@
             </a:pPr>
             <a:r>
               <a:rPr lang="bg-BG" dirty="0">
-                <a:latin typeface="JetBrains Mono" panose="02000009000000000000" pitchFamily="49" charset="0"/>
+                <a:latin typeface="Century Gothic" panose="020B0502020202020204" pitchFamily="34" charset="0"/>
                 <a:ea typeface="JetBrains Mono" panose="02000009000000000000" pitchFamily="49" charset="0"/>
                 <a:cs typeface="JetBrains Mono" panose="02000009000000000000" pitchFamily="49" charset="0"/>
               </a:rPr>
@@ -28662,7 +28804,7 @@
             </a:r>
             <a:r>
               <a:rPr lang="en-GB" dirty="0">
-                <a:latin typeface="JetBrains Mono" panose="02000009000000000000" pitchFamily="49" charset="0"/>
+                <a:latin typeface="Century Gothic" panose="020B0502020202020204" pitchFamily="34" charset="0"/>
                 <a:ea typeface="JetBrains Mono" panose="02000009000000000000" pitchFamily="49" charset="0"/>
                 <a:cs typeface="JetBrains Mono" panose="02000009000000000000" pitchFamily="49" charset="0"/>
               </a:rPr>
@@ -28670,14 +28812,14 @@
             </a:r>
             <a:r>
               <a:rPr lang="bg-BG" dirty="0">
-                <a:latin typeface="JetBrains Mono" panose="02000009000000000000" pitchFamily="49" charset="0"/>
+                <a:latin typeface="Century Gothic" panose="020B0502020202020204" pitchFamily="34" charset="0"/>
                 <a:ea typeface="JetBrains Mono" panose="02000009000000000000" pitchFamily="49" charset="0"/>
                 <a:cs typeface="JetBrains Mono" panose="02000009000000000000" pitchFamily="49" charset="0"/>
               </a:rPr>
               <a:t>Любомир Романов</a:t>
             </a:r>
             <a:endParaRPr lang="ru-RU" dirty="0">
-              <a:latin typeface="JetBrains Mono" panose="02000009000000000000" pitchFamily="49" charset="0"/>
+              <a:latin typeface="Century Gothic" panose="020B0502020202020204" pitchFamily="34" charset="0"/>
               <a:ea typeface="JetBrains Mono" panose="02000009000000000000" pitchFamily="49" charset="0"/>
               <a:cs typeface="JetBrains Mono" panose="02000009000000000000" pitchFamily="49" charset="0"/>
             </a:endParaRPr>
@@ -28694,14 +28836,14 @@
             </a:pPr>
             <a:r>
               <a:rPr lang="bg-BG" dirty="0">
-                <a:latin typeface="JetBrains Mono" panose="02000009000000000000" pitchFamily="49" charset="0"/>
+                <a:latin typeface="Century Gothic" panose="020B0502020202020204" pitchFamily="34" charset="0"/>
                 <a:ea typeface="JetBrains Mono" panose="02000009000000000000" pitchFamily="49" charset="0"/>
                 <a:cs typeface="JetBrains Mono" panose="02000009000000000000" pitchFamily="49" charset="0"/>
               </a:rPr>
               <a:t>МГ „Академик Кирил Попов“ 11В</a:t>
             </a:r>
             <a:endParaRPr lang="ru-RU" dirty="0">
-              <a:latin typeface="JetBrains Mono" panose="02000009000000000000" pitchFamily="49" charset="0"/>
+              <a:latin typeface="Century Gothic" panose="020B0502020202020204" pitchFamily="34" charset="0"/>
               <a:ea typeface="JetBrains Mono" panose="02000009000000000000" pitchFamily="49" charset="0"/>
               <a:cs typeface="JetBrains Mono" panose="02000009000000000000" pitchFamily="49" charset="0"/>
             </a:endParaRPr>
@@ -28718,7 +28860,7 @@
             </a:pPr>
             <a:r>
               <a:rPr lang="es-ES" dirty="0">
-                <a:latin typeface="JetBrains Mono" panose="02000009000000000000" pitchFamily="49" charset="0"/>
+                <a:latin typeface="Century Gothic" panose="020B0502020202020204" pitchFamily="34" charset="0"/>
                 <a:ea typeface="JetBrains Mono" panose="02000009000000000000" pitchFamily="49" charset="0"/>
                 <a:cs typeface="JetBrains Mono" panose="02000009000000000000" pitchFamily="49" charset="0"/>
               </a:rPr>
@@ -28998,7 +29140,7 @@
                 <a:solidFill>
                   <a:schemeClr val="accent1"/>
                 </a:solidFill>
-                <a:latin typeface="JetBrains Mono" panose="02000009000000000000" pitchFamily="49" charset="0"/>
+                <a:latin typeface="Century Gothic" panose="020B0502020202020204" pitchFamily="34" charset="0"/>
                 <a:ea typeface="JetBrains Mono" panose="02000009000000000000" pitchFamily="49" charset="0"/>
                 <a:cs typeface="JetBrains Mono" panose="02000009000000000000" pitchFamily="49" charset="0"/>
               </a:rPr>
@@ -29008,7 +29150,7 @@
               <a:solidFill>
                 <a:schemeClr val="accent2"/>
               </a:solidFill>
-              <a:latin typeface="JetBrains Mono" panose="02000009000000000000" pitchFamily="49" charset="0"/>
+              <a:latin typeface="Century Gothic" panose="020B0502020202020204" pitchFamily="34" charset="0"/>
               <a:ea typeface="JetBrains Mono" panose="02000009000000000000" pitchFamily="49" charset="0"/>
               <a:cs typeface="JetBrains Mono" panose="02000009000000000000" pitchFamily="49" charset="0"/>
             </a:endParaRPr>
@@ -29123,7 +29265,7 @@
             </a:pPr>
             <a:r>
               <a:rPr lang="ru-RU" dirty="0">
-                <a:latin typeface="JetBrains Mono" panose="02000009000000000000" pitchFamily="49" charset="0"/>
+                <a:latin typeface="Century Gothic" panose="020B0502020202020204" pitchFamily="34" charset="0"/>
                 <a:ea typeface="JetBrains Mono" panose="02000009000000000000" pitchFamily="49" charset="0"/>
                 <a:cs typeface="JetBrains Mono" panose="02000009000000000000" pitchFamily="49" charset="0"/>
               </a:rPr>
@@ -29131,7 +29273,7 @@
             </a:r>
             <a:r>
               <a:rPr lang="en-US" dirty="0">
-                <a:latin typeface="JetBrains Mono" panose="02000009000000000000" pitchFamily="49" charset="0"/>
+                <a:latin typeface="Century Gothic" panose="020B0502020202020204" pitchFamily="34" charset="0"/>
                 <a:ea typeface="JetBrains Mono" panose="02000009000000000000" pitchFamily="49" charset="0"/>
                 <a:cs typeface="JetBrains Mono" panose="02000009000000000000" pitchFamily="49" charset="0"/>
               </a:rPr>
@@ -29139,7 +29281,7 @@
             </a:r>
             <a:r>
               <a:rPr lang="ru-RU" dirty="0">
-                <a:latin typeface="JetBrains Mono" panose="02000009000000000000" pitchFamily="49" charset="0"/>
+                <a:latin typeface="Century Gothic" panose="020B0502020202020204" pitchFamily="34" charset="0"/>
                 <a:ea typeface="JetBrains Mono" panose="02000009000000000000" pitchFamily="49" charset="0"/>
                 <a:cs typeface="JetBrains Mono" panose="02000009000000000000" pitchFamily="49" charset="0"/>
               </a:rPr>
@@ -29147,7 +29289,7 @@
             </a:r>
             <a:r>
               <a:rPr lang="en-US" dirty="0">
-                <a:latin typeface="JetBrains Mono" panose="02000009000000000000" pitchFamily="49" charset="0"/>
+                <a:latin typeface="Century Gothic" panose="020B0502020202020204" pitchFamily="34" charset="0"/>
                 <a:ea typeface="JetBrains Mono" panose="02000009000000000000" pitchFamily="49" charset="0"/>
                 <a:cs typeface="JetBrains Mono" panose="02000009000000000000" pitchFamily="49" charset="0"/>
               </a:rPr>
@@ -29155,7 +29297,7 @@
             </a:r>
             <a:r>
               <a:rPr lang="ru-RU" dirty="0">
-                <a:latin typeface="JetBrains Mono" panose="02000009000000000000" pitchFamily="49" charset="0"/>
+                <a:latin typeface="Century Gothic" panose="020B0502020202020204" pitchFamily="34" charset="0"/>
                 <a:ea typeface="JetBrains Mono" panose="02000009000000000000" pitchFamily="49" charset="0"/>
                 <a:cs typeface="JetBrains Mono" panose="02000009000000000000" pitchFamily="49" charset="0"/>
               </a:rPr>
@@ -29163,7 +29305,7 @@
             </a:r>
             <a:r>
               <a:rPr lang="bg-BG" dirty="0">
-                <a:latin typeface="JetBrains Mono" panose="02000009000000000000" pitchFamily="49" charset="0"/>
+                <a:latin typeface="Century Gothic" panose="020B0502020202020204" pitchFamily="34" charset="0"/>
                 <a:ea typeface="JetBrains Mono" panose="02000009000000000000" pitchFamily="49" charset="0"/>
                 <a:cs typeface="JetBrains Mono" panose="02000009000000000000" pitchFamily="49" charset="0"/>
               </a:rPr>
@@ -29171,7 +29313,7 @@
             </a:r>
             <a:r>
               <a:rPr lang="ru-RU" dirty="0">
-                <a:latin typeface="JetBrains Mono" panose="02000009000000000000" pitchFamily="49" charset="0"/>
+                <a:latin typeface="Century Gothic" panose="020B0502020202020204" pitchFamily="34" charset="0"/>
                 <a:ea typeface="JetBrains Mono" panose="02000009000000000000" pitchFamily="49" charset="0"/>
                 <a:cs typeface="JetBrains Mono" panose="02000009000000000000" pitchFamily="49" charset="0"/>
               </a:rPr>
@@ -29190,7 +29332,7 @@
             </a:pPr>
             <a:r>
               <a:rPr lang="ru-RU" dirty="0">
-                <a:latin typeface="JetBrains Mono" panose="02000009000000000000" pitchFamily="49" charset="0"/>
+                <a:latin typeface="Century Gothic" panose="020B0502020202020204" pitchFamily="34" charset="0"/>
                 <a:ea typeface="JetBrains Mono" panose="02000009000000000000" pitchFamily="49" charset="0"/>
                 <a:cs typeface="JetBrains Mono" panose="02000009000000000000" pitchFamily="49" charset="0"/>
               </a:rPr>
@@ -30354,14 +30496,14 @@
             </a:pPr>
             <a:r>
               <a:rPr lang="bg-BG" dirty="0">
-                <a:latin typeface="JetBrains Mono" panose="02000009000000000000" pitchFamily="49" charset="0"/>
+                <a:latin typeface="Century Gothic" panose="020B0502020202020204" pitchFamily="34" charset="0"/>
                 <a:ea typeface="JetBrains Mono" panose="02000009000000000000" pitchFamily="49" charset="0"/>
                 <a:cs typeface="JetBrains Mono" panose="02000009000000000000" pitchFamily="49" charset="0"/>
               </a:rPr>
               <a:t>Цел</a:t>
             </a:r>
             <a:endParaRPr dirty="0">
-              <a:latin typeface="JetBrains Mono" panose="02000009000000000000" pitchFamily="49" charset="0"/>
+              <a:latin typeface="Century Gothic" panose="020B0502020202020204" pitchFamily="34" charset="0"/>
               <a:ea typeface="JetBrains Mono" panose="02000009000000000000" pitchFamily="49" charset="0"/>
               <a:cs typeface="JetBrains Mono" panose="02000009000000000000" pitchFamily="49" charset="0"/>
             </a:endParaRPr>
@@ -30433,8 +30575,8 @@
                   <a:schemeClr val="accent1"/>
                 </a:solidFill>
                 <a:latin typeface="Century Gothic" panose="020B0502020202020204" pitchFamily="34" charset="0"/>
-                <a:ea typeface="Josefin Sans"/>
-                <a:cs typeface="Josefin Sans"/>
+                <a:ea typeface="JetBrains Mono" panose="02000009000000000000" pitchFamily="49" charset="0"/>
+                <a:cs typeface="JetBrains Mono" panose="02000009000000000000" pitchFamily="49" charset="0"/>
                 <a:sym typeface="Josefin Sans"/>
               </a:rPr>
               <a:t>Избор на темата</a:t>
@@ -30482,8 +30624,8 @@
                   <a:schemeClr val="accent2"/>
                 </a:solidFill>
                 <a:latin typeface="Century Gothic" panose="020B0502020202020204" pitchFamily="34" charset="0"/>
-                <a:ea typeface="Josefin Sans"/>
-                <a:cs typeface="Josefin Sans"/>
+                <a:ea typeface="JetBrains Mono" panose="02000009000000000000" pitchFamily="49" charset="0"/>
+                <a:cs typeface="JetBrains Mono" panose="02000009000000000000" pitchFamily="49" charset="0"/>
                 <a:sym typeface="Josefin Sans"/>
               </a:rPr>
               <a:t>Определяне на структурата на приложението</a:t>
@@ -30553,7 +30695,7 @@
         </p:nvSpPr>
         <p:spPr>
           <a:xfrm>
-            <a:off x="4682301" y="3962406"/>
+            <a:off x="4794843" y="3797581"/>
             <a:ext cx="2589000" cy="527700"/>
           </a:xfrm>
           <a:prstGeom prst="rect">
@@ -30625,8 +30767,8 @@
                   <a:schemeClr val="accent1"/>
                 </a:solidFill>
                 <a:latin typeface="Century Gothic" panose="020B0502020202020204" pitchFamily="34" charset="0"/>
-                <a:ea typeface="Josefin Sans"/>
-                <a:cs typeface="Josefin Sans"/>
+                <a:ea typeface="JetBrains Mono" panose="02000009000000000000" pitchFamily="49" charset="0"/>
+                <a:cs typeface="JetBrains Mono" panose="02000009000000000000" pitchFamily="49" charset="0"/>
                 <a:sym typeface="Josefin Sans"/>
               </a:rPr>
               <a:t>Изработване на приложението</a:t>
@@ -30670,14 +30812,14 @@
             </a:pPr>
             <a:r>
               <a:rPr lang="en" dirty="0">
-                <a:latin typeface="JetBrains Mono" panose="02000009000000000000" pitchFamily="49" charset="0"/>
+                <a:latin typeface="Century Gothic" panose="020B0502020202020204" pitchFamily="34" charset="0"/>
                 <a:ea typeface="JetBrains Mono" panose="02000009000000000000" pitchFamily="49" charset="0"/>
                 <a:cs typeface="JetBrains Mono" panose="02000009000000000000" pitchFamily="49" charset="0"/>
               </a:rPr>
               <a:t>01</a:t>
             </a:r>
             <a:endParaRPr dirty="0">
-              <a:latin typeface="JetBrains Mono" panose="02000009000000000000" pitchFamily="49" charset="0"/>
+              <a:latin typeface="Century Gothic" panose="020B0502020202020204" pitchFamily="34" charset="0"/>
               <a:ea typeface="JetBrains Mono" panose="02000009000000000000" pitchFamily="49" charset="0"/>
               <a:cs typeface="JetBrains Mono" panose="02000009000000000000" pitchFamily="49" charset="0"/>
             </a:endParaRPr>
@@ -30719,10 +30861,18 @@
               <a:buNone/>
             </a:pPr>
             <a:r>
-              <a:rPr lang="en"/>
+              <a:rPr lang="en" dirty="0">
+                <a:latin typeface="Century Gothic" panose="020B0502020202020204" pitchFamily="34" charset="0"/>
+                <a:ea typeface="JetBrains Mono" panose="02000009000000000000" pitchFamily="49" charset="0"/>
+                <a:cs typeface="JetBrains Mono" panose="02000009000000000000" pitchFamily="49" charset="0"/>
+              </a:rPr>
               <a:t>02</a:t>
             </a:r>
-            <a:endParaRPr/>
+            <a:endParaRPr dirty="0">
+              <a:latin typeface="Century Gothic" panose="020B0502020202020204" pitchFamily="34" charset="0"/>
+              <a:ea typeface="JetBrains Mono" panose="02000009000000000000" pitchFamily="49" charset="0"/>
+              <a:cs typeface="JetBrains Mono" panose="02000009000000000000" pitchFamily="49" charset="0"/>
+            </a:endParaRPr>
           </a:p>
         </p:txBody>
       </p:sp>
@@ -30761,10 +30911,18 @@
               <a:buNone/>
             </a:pPr>
             <a:r>
-              <a:rPr lang="en"/>
+              <a:rPr lang="en" dirty="0">
+                <a:latin typeface="Century Gothic" panose="020B0502020202020204" pitchFamily="34" charset="0"/>
+                <a:ea typeface="JetBrains Mono" panose="02000009000000000000" pitchFamily="49" charset="0"/>
+                <a:cs typeface="JetBrains Mono" panose="02000009000000000000" pitchFamily="49" charset="0"/>
+              </a:rPr>
               <a:t>03</a:t>
             </a:r>
-            <a:endParaRPr/>
+            <a:endParaRPr dirty="0">
+              <a:latin typeface="Century Gothic" panose="020B0502020202020204" pitchFamily="34" charset="0"/>
+              <a:ea typeface="JetBrains Mono" panose="02000009000000000000" pitchFamily="49" charset="0"/>
+              <a:cs typeface="JetBrains Mono" panose="02000009000000000000" pitchFamily="49" charset="0"/>
+            </a:endParaRPr>
           </a:p>
         </p:txBody>
       </p:sp>
@@ -30780,7 +30938,7 @@
         </p:nvSpPr>
         <p:spPr>
           <a:xfrm>
-            <a:off x="5430077" y="3251681"/>
+            <a:off x="5542619" y="3086856"/>
             <a:ext cx="983100" cy="639000"/>
           </a:xfrm>
           <a:prstGeom prst="rect">
@@ -30803,10 +30961,14 @@
               <a:buNone/>
             </a:pPr>
             <a:r>
-              <a:rPr lang="en" dirty="0"/>
+              <a:rPr lang="en" dirty="0">
+                <a:latin typeface="Century Gothic" panose="020B0502020202020204" pitchFamily="34" charset="0"/>
+              </a:rPr>
               <a:t>05</a:t>
             </a:r>
-            <a:endParaRPr dirty="0"/>
+            <a:endParaRPr dirty="0">
+              <a:latin typeface="Century Gothic" panose="020B0502020202020204" pitchFamily="34" charset="0"/>
+            </a:endParaRPr>
           </a:p>
         </p:txBody>
       </p:sp>
@@ -30845,10 +31007,14 @@
               <a:buNone/>
             </a:pPr>
             <a:r>
-              <a:rPr lang="en"/>
+              <a:rPr lang="en" dirty="0">
+                <a:latin typeface="Century Gothic" panose="020B0502020202020204" pitchFamily="34" charset="0"/>
+              </a:rPr>
               <a:t>04</a:t>
             </a:r>
-            <a:endParaRPr/>
+            <a:endParaRPr dirty="0">
+              <a:latin typeface="Century Gothic" panose="020B0502020202020204" pitchFamily="34" charset="0"/>
+            </a:endParaRPr>
           </a:p>
         </p:txBody>
       </p:sp>
@@ -31533,11 +31699,19 @@
             <a:pPr algn="ctr"/>
             <a:r>
               <a:rPr lang="ru-RU" dirty="0">
+                <a:latin typeface="Century Gothic" panose="020B0502020202020204" pitchFamily="34" charset="0"/>
+                <a:ea typeface="JetBrains Mono" panose="02000009000000000000" pitchFamily="49" charset="0"/>
+                <a:cs typeface="JetBrains Mono" panose="02000009000000000000" pitchFamily="49" charset="0"/>
+              </a:rPr>
+              <a:t>Основни етапи в реализирането на </a:t>
+            </a:r>
+            <a:r>
+              <a:rPr lang="ru-RU" dirty="0">
                 <a:latin typeface="JetBrains Mono" panose="02000009000000000000" pitchFamily="49" charset="0"/>
                 <a:ea typeface="JetBrains Mono" panose="02000009000000000000" pitchFamily="49" charset="0"/>
                 <a:cs typeface="JetBrains Mono" panose="02000009000000000000" pitchFamily="49" charset="0"/>
               </a:rPr>
-              <a:t>Основни етапи в реализирането на проекта</a:t>
+              <a:t>проекта</a:t>
             </a:r>
           </a:p>
         </p:txBody>

</xml_diff>